<commit_message>
Updating some of the prezos
</commit_message>
<xml_diff>
--- a/companion-website/public/files/2. Gardening and Harvesting.pptx
+++ b/companion-website/public/files/2. Gardening and Harvesting.pptx
@@ -5,17 +5,18 @@
     <p:sldMasterId id="2147483648" r:id="rId1"/>
   </p:sldMasterIdLst>
   <p:notesMasterIdLst>
-    <p:notesMasterId r:id="rId10"/>
+    <p:notesMasterId r:id="rId11"/>
   </p:notesMasterIdLst>
   <p:sldIdLst>
     <p:sldId id="275" r:id="rId2"/>
-    <p:sldId id="438" r:id="rId3"/>
-    <p:sldId id="456" r:id="rId4"/>
-    <p:sldId id="459" r:id="rId5"/>
-    <p:sldId id="461" r:id="rId6"/>
-    <p:sldId id="457" r:id="rId7"/>
-    <p:sldId id="458" r:id="rId8"/>
-    <p:sldId id="455" r:id="rId9"/>
+    <p:sldId id="462" r:id="rId3"/>
+    <p:sldId id="438" r:id="rId4"/>
+    <p:sldId id="456" r:id="rId5"/>
+    <p:sldId id="459" r:id="rId6"/>
+    <p:sldId id="461" r:id="rId7"/>
+    <p:sldId id="457" r:id="rId8"/>
+    <p:sldId id="458" r:id="rId9"/>
+    <p:sldId id="455" r:id="rId10"/>
   </p:sldIdLst>
   <p:sldSz cx="9144000" cy="6858000" type="screen4x3"/>
   <p:notesSz cx="6858000" cy="9144000"/>
@@ -215,7 +216,7 @@
           <a:p>
             <a:fld id="{8F7EB338-8BB0-B64B-9F79-C87EA24D723F}" type="datetimeFigureOut">
               <a:rPr lang="en-US" smtClean="0"/>
-              <a:t>9/22/20</a:t>
+              <a:t>5/28/2024</a:t>
             </a:fld>
             <a:endParaRPr lang="en-US"/>
           </a:p>
@@ -547,7 +548,7 @@
           <a:p>
             <a:fld id="{0A2C3B37-55FA-284F-9E83-751B4EA6E9B4}" type="slidenum">
               <a:rPr lang="en-US" smtClean="0"/>
-              <a:t>8</a:t>
+              <a:t>9</a:t>
             </a:fld>
             <a:endParaRPr lang="en-US"/>
           </a:p>
@@ -750,7 +751,7 @@
             <a:fld id="{DBE77699-C466-4996-ADED-71C8160E04A2}" type="datetimeFigureOut">
               <a:rPr lang="en-US" smtClean="0"/>
               <a:pPr/>
-              <a:t>9/22/20</a:t>
+              <a:t>5/28/2024</a:t>
             </a:fld>
             <a:endParaRPr lang="en-US"/>
           </a:p>
@@ -915,7 +916,7 @@
             <a:fld id="{DBE77699-C466-4996-ADED-71C8160E04A2}" type="datetimeFigureOut">
               <a:rPr lang="en-US" smtClean="0"/>
               <a:pPr/>
-              <a:t>9/22/20</a:t>
+              <a:t>5/28/2024</a:t>
             </a:fld>
             <a:endParaRPr lang="en-US"/>
           </a:p>
@@ -1090,7 +1091,7 @@
             <a:fld id="{DBE77699-C466-4996-ADED-71C8160E04A2}" type="datetimeFigureOut">
               <a:rPr lang="en-US" smtClean="0"/>
               <a:pPr/>
-              <a:t>9/22/20</a:t>
+              <a:t>5/28/2024</a:t>
             </a:fld>
             <a:endParaRPr lang="en-US"/>
           </a:p>
@@ -1209,7 +1210,7 @@
             <a:fld id="{DBE77699-C466-4996-ADED-71C8160E04A2}" type="datetimeFigureOut">
               <a:rPr lang="en-US" smtClean="0"/>
               <a:pPr/>
-              <a:t>9/22/20</a:t>
+              <a:t>5/28/2024</a:t>
             </a:fld>
             <a:endParaRPr lang="en-US"/>
           </a:p>
@@ -1509,6 +1510,229 @@
 </p:sldLayout>
 </file>
 
+<file path=ppt/slideLayouts/slideLayout13.xml><?xml version="1.0" encoding="utf-8"?>
+<p:sldLayout xmlns:a="http://schemas.openxmlformats.org/drawingml/2006/main" xmlns:r="http://schemas.openxmlformats.org/officeDocument/2006/relationships" xmlns:p="http://schemas.openxmlformats.org/presentationml/2006/main" userDrawn="1">
+  <p:cSld name="1_Title and Content">
+    <p:spTree>
+      <p:nvGrpSpPr>
+        <p:cNvPr id="1" name=""/>
+        <p:cNvGrpSpPr/>
+        <p:nvPr/>
+      </p:nvGrpSpPr>
+      <p:grpSpPr>
+        <a:xfrm>
+          <a:off x="0" y="0"/>
+          <a:ext cx="0" cy="0"/>
+          <a:chOff x="0" y="0"/>
+          <a:chExt cx="0" cy="0"/>
+        </a:xfrm>
+      </p:grpSpPr>
+      <p:sp>
+        <p:nvSpPr>
+          <p:cNvPr id="2" name="Title 1"/>
+          <p:cNvSpPr>
+            <a:spLocks noGrp="1"/>
+          </p:cNvSpPr>
+          <p:nvPr>
+            <p:ph type="title"/>
+          </p:nvPr>
+        </p:nvSpPr>
+        <p:spPr>
+          <a:xfrm>
+            <a:off x="4417" y="0"/>
+            <a:ext cx="9144000" cy="838200"/>
+          </a:xfrm>
+        </p:spPr>
+        <p:txBody>
+          <a:bodyPr/>
+          <a:lstStyle>
+            <a:lvl1pPr>
+              <a:defRPr b="1"/>
+            </a:lvl1pPr>
+          </a:lstStyle>
+          <a:p>
+            <a:r>
+              <a:rPr lang="en-US" dirty="0"/>
+              <a:t>Click to edit Master title style</a:t>
+            </a:r>
+          </a:p>
+        </p:txBody>
+      </p:sp>
+      <p:sp>
+        <p:nvSpPr>
+          <p:cNvPr id="3" name="Content Placeholder 2"/>
+          <p:cNvSpPr>
+            <a:spLocks noGrp="1"/>
+          </p:cNvSpPr>
+          <p:nvPr>
+            <p:ph idx="1"/>
+          </p:nvPr>
+        </p:nvSpPr>
+        <p:spPr>
+          <a:xfrm>
+            <a:off x="0" y="1371600"/>
+            <a:ext cx="9144000" cy="4754563"/>
+          </a:xfrm>
+        </p:spPr>
+        <p:txBody>
+          <a:bodyPr/>
+          <a:lstStyle/>
+          <a:p>
+            <a:pPr lvl="0"/>
+            <a:r>
+              <a:rPr lang="en-US"/>
+              <a:t>Click to edit Master text styles</a:t>
+            </a:r>
+          </a:p>
+          <a:p>
+            <a:pPr lvl="1"/>
+            <a:r>
+              <a:rPr lang="en-US"/>
+              <a:t>Second level</a:t>
+            </a:r>
+          </a:p>
+          <a:p>
+            <a:pPr lvl="2"/>
+            <a:r>
+              <a:rPr lang="en-US"/>
+              <a:t>Third level</a:t>
+            </a:r>
+          </a:p>
+          <a:p>
+            <a:pPr lvl="3"/>
+            <a:r>
+              <a:rPr lang="en-US"/>
+              <a:t>Fourth level</a:t>
+            </a:r>
+          </a:p>
+          <a:p>
+            <a:pPr lvl="4"/>
+            <a:r>
+              <a:rPr lang="en-US"/>
+              <a:t>Fifth level</a:t>
+            </a:r>
+          </a:p>
+        </p:txBody>
+      </p:sp>
+      <p:sp>
+        <p:nvSpPr>
+          <p:cNvPr id="4" name="Date Placeholder 3"/>
+          <p:cNvSpPr>
+            <a:spLocks noGrp="1"/>
+          </p:cNvSpPr>
+          <p:nvPr>
+            <p:ph type="dt" sz="half" idx="10"/>
+          </p:nvPr>
+        </p:nvSpPr>
+        <p:spPr/>
+        <p:txBody>
+          <a:bodyPr/>
+          <a:lstStyle/>
+          <a:p>
+            <a:fld id="{DBE77699-C466-4996-ADED-71C8160E04A2}" type="datetimeFigureOut">
+              <a:rPr lang="en-US" smtClean="0"/>
+              <a:pPr/>
+              <a:t>5/28/2024</a:t>
+            </a:fld>
+            <a:endParaRPr lang="en-US"/>
+          </a:p>
+        </p:txBody>
+      </p:sp>
+      <p:sp>
+        <p:nvSpPr>
+          <p:cNvPr id="5" name="Footer Placeholder 4"/>
+          <p:cNvSpPr>
+            <a:spLocks noGrp="1"/>
+          </p:cNvSpPr>
+          <p:nvPr>
+            <p:ph type="ftr" sz="quarter" idx="11"/>
+          </p:nvPr>
+        </p:nvSpPr>
+        <p:spPr/>
+        <p:txBody>
+          <a:bodyPr/>
+          <a:lstStyle/>
+          <a:p>
+            <a:endParaRPr lang="en-US"/>
+          </a:p>
+        </p:txBody>
+      </p:sp>
+      <p:sp>
+        <p:nvSpPr>
+          <p:cNvPr id="6" name="Slide Number Placeholder 5"/>
+          <p:cNvSpPr>
+            <a:spLocks noGrp="1"/>
+          </p:cNvSpPr>
+          <p:nvPr>
+            <p:ph type="sldNum" sz="quarter" idx="12"/>
+          </p:nvPr>
+        </p:nvSpPr>
+        <p:spPr/>
+        <p:txBody>
+          <a:bodyPr/>
+          <a:lstStyle/>
+          <a:p>
+            <a:fld id="{ECD645EE-450D-4102-8FB2-AECCE2D0F3DF}" type="slidenum">
+              <a:rPr lang="en-US" smtClean="0"/>
+              <a:pPr/>
+              <a:t>‹#›</a:t>
+            </a:fld>
+            <a:endParaRPr lang="en-US"/>
+          </a:p>
+        </p:txBody>
+      </p:sp>
+      <p:sp>
+        <p:nvSpPr>
+          <p:cNvPr id="9" name="Text Placeholder 8"/>
+          <p:cNvSpPr>
+            <a:spLocks noGrp="1"/>
+          </p:cNvSpPr>
+          <p:nvPr>
+            <p:ph type="body" sz="quarter" idx="13" hasCustomPrompt="1"/>
+          </p:nvPr>
+        </p:nvSpPr>
+        <p:spPr>
+          <a:xfrm>
+            <a:off x="0" y="838200"/>
+            <a:ext cx="9144000" cy="533400"/>
+          </a:xfrm>
+        </p:spPr>
+        <p:txBody>
+          <a:bodyPr>
+            <a:normAutofit/>
+          </a:bodyPr>
+          <a:lstStyle>
+            <a:lvl1pPr marL="0" indent="0">
+              <a:buNone/>
+              <a:defRPr sz="2400" b="1">
+                <a:solidFill>
+                  <a:srgbClr val="7F7F7F"/>
+                </a:solidFill>
+              </a:defRPr>
+            </a:lvl1pPr>
+          </a:lstStyle>
+          <a:p>
+            <a:pPr lvl="0"/>
+            <a:r>
+              <a:rPr lang="en-US" dirty="0"/>
+              <a:t>Click to edit sub-title</a:t>
+            </a:r>
+          </a:p>
+        </p:txBody>
+      </p:sp>
+    </p:spTree>
+    <p:extLst>
+      <p:ext uri="{BB962C8B-B14F-4D97-AF65-F5344CB8AC3E}">
+        <p14:creationId xmlns:p14="http://schemas.microsoft.com/office/powerpoint/2010/main" val="916436677"/>
+      </p:ext>
+    </p:extLst>
+  </p:cSld>
+  <p:clrMapOvr>
+    <a:masterClrMapping/>
+  </p:clrMapOvr>
+</p:sldLayout>
+</file>
+
 <file path=ppt/slideLayouts/slideLayout2.xml><?xml version="1.0" encoding="utf-8"?>
 <p:sldLayout xmlns:a="http://schemas.openxmlformats.org/drawingml/2006/main" xmlns:r="http://schemas.openxmlformats.org/officeDocument/2006/relationships" xmlns:p="http://schemas.openxmlformats.org/presentationml/2006/main" type="obj" preserve="1">
   <p:cSld name="Title and Content">
@@ -1617,7 +1841,7 @@
             <a:fld id="{DBE77699-C466-4996-ADED-71C8160E04A2}" type="datetimeFigureOut">
               <a:rPr lang="en-US" smtClean="0"/>
               <a:pPr/>
-              <a:t>9/22/20</a:t>
+              <a:t>5/28/2024</a:t>
             </a:fld>
             <a:endParaRPr lang="en-US"/>
           </a:p>
@@ -1859,7 +2083,7 @@
             <a:fld id="{DBE77699-C466-4996-ADED-71C8160E04A2}" type="datetimeFigureOut">
               <a:rPr lang="en-US" smtClean="0"/>
               <a:pPr/>
-              <a:t>9/22/20</a:t>
+              <a:t>5/28/2024</a:t>
             </a:fld>
             <a:endParaRPr lang="en-US"/>
           </a:p>
@@ -2141,7 +2365,7 @@
             <a:fld id="{DBE77699-C466-4996-ADED-71C8160E04A2}" type="datetimeFigureOut">
               <a:rPr lang="en-US" smtClean="0"/>
               <a:pPr/>
-              <a:t>9/22/20</a:t>
+              <a:t>5/28/2024</a:t>
             </a:fld>
             <a:endParaRPr lang="en-US"/>
           </a:p>
@@ -2557,7 +2781,7 @@
             <a:fld id="{DBE77699-C466-4996-ADED-71C8160E04A2}" type="datetimeFigureOut">
               <a:rPr lang="en-US" smtClean="0"/>
               <a:pPr/>
-              <a:t>9/22/20</a:t>
+              <a:t>5/28/2024</a:t>
             </a:fld>
             <a:endParaRPr lang="en-US"/>
           </a:p>
@@ -2671,7 +2895,7 @@
             <a:fld id="{DBE77699-C466-4996-ADED-71C8160E04A2}" type="datetimeFigureOut">
               <a:rPr lang="en-US" smtClean="0"/>
               <a:pPr/>
-              <a:t>9/22/20</a:t>
+              <a:t>5/28/2024</a:t>
             </a:fld>
             <a:endParaRPr lang="en-US"/>
           </a:p>
@@ -2763,7 +2987,7 @@
             <a:fld id="{DBE77699-C466-4996-ADED-71C8160E04A2}" type="datetimeFigureOut">
               <a:rPr lang="en-US" smtClean="0"/>
               <a:pPr/>
-              <a:t>9/22/20</a:t>
+              <a:t>5/28/2024</a:t>
             </a:fld>
             <a:endParaRPr lang="en-US"/>
           </a:p>
@@ -3035,7 +3259,7 @@
             <a:fld id="{DBE77699-C466-4996-ADED-71C8160E04A2}" type="datetimeFigureOut">
               <a:rPr lang="en-US" smtClean="0"/>
               <a:pPr/>
-              <a:t>9/22/20</a:t>
+              <a:t>5/28/2024</a:t>
             </a:fld>
             <a:endParaRPr lang="en-US"/>
           </a:p>
@@ -3284,7 +3508,7 @@
             <a:fld id="{DBE77699-C466-4996-ADED-71C8160E04A2}" type="datetimeFigureOut">
               <a:rPr lang="en-US" smtClean="0"/>
               <a:pPr/>
-              <a:t>9/22/20</a:t>
+              <a:t>5/28/2024</a:t>
             </a:fld>
             <a:endParaRPr lang="en-US"/>
           </a:p>
@@ -3495,7 +3719,7 @@
             <a:fld id="{DBE77699-C466-4996-ADED-71C8160E04A2}" type="datetimeFigureOut">
               <a:rPr lang="en-US" smtClean="0"/>
               <a:pPr/>
-              <a:t>9/22/20</a:t>
+              <a:t>5/28/2024</a:t>
             </a:fld>
             <a:endParaRPr lang="en-US"/>
           </a:p>
@@ -3596,6 +3820,7 @@
     <p:sldLayoutId id="2147483658" r:id="rId10"/>
     <p:sldLayoutId id="2147483659" r:id="rId11"/>
     <p:sldLayoutId id="2147483661" r:id="rId12"/>
+    <p:sldLayoutId id="2147483662" r:id="rId13"/>
   </p:sldLayoutIdLst>
   <p:txStyles>
     <p:titleStyle>
@@ -4708,48 +4933,423 @@
           <a:chExt cx="0" cy="0"/>
         </a:xfrm>
       </p:grpSpPr>
-      <p:sp>
-        <p:nvSpPr>
-          <p:cNvPr id="2" name="Title 1"/>
-          <p:cNvSpPr>
-            <a:spLocks noGrp="1"/>
-          </p:cNvSpPr>
-          <p:nvPr>
-            <p:ph type="title"/>
-          </p:nvPr>
-        </p:nvSpPr>
-        <p:spPr/>
-        <p:txBody>
-          <a:bodyPr>
-            <a:normAutofit fontScale="90000"/>
+      <p:grpSp>
+        <p:nvGrpSpPr>
+          <p:cNvPr id="4" name="Group 3">
+            <a:extLst>
+              <a:ext uri="{FF2B5EF4-FFF2-40B4-BE49-F238E27FC236}">
+                <a16:creationId xmlns:a16="http://schemas.microsoft.com/office/drawing/2014/main" id="{76D0AD62-610F-2343-9B0E-52F648458EA8}"/>
+              </a:ext>
+            </a:extLst>
+          </p:cNvPr>
+          <p:cNvGrpSpPr/>
+          <p:nvPr/>
+        </p:nvGrpSpPr>
+        <p:grpSpPr>
+          <a:xfrm>
+            <a:off x="209549" y="1669464"/>
+            <a:ext cx="8724901" cy="954107"/>
+            <a:chOff x="304800" y="4648200"/>
+            <a:chExt cx="8724901" cy="954107"/>
+          </a:xfrm>
+        </p:grpSpPr>
+        <p:sp>
+          <p:nvSpPr>
+            <p:cNvPr id="2" name="TextBox 1">
+              <a:extLst>
+                <a:ext uri="{FF2B5EF4-FFF2-40B4-BE49-F238E27FC236}">
+                  <a16:creationId xmlns:a16="http://schemas.microsoft.com/office/drawing/2014/main" id="{65E69FF4-5D6C-1F4A-BC1D-8328E1004154}"/>
+                </a:ext>
+              </a:extLst>
+            </p:cNvPr>
+            <p:cNvSpPr txBox="1"/>
+            <p:nvPr/>
+          </p:nvSpPr>
+          <p:spPr>
+            <a:xfrm>
+              <a:off x="304800" y="4648200"/>
+              <a:ext cx="1147943" cy="523220"/>
+            </a:xfrm>
+            <a:prstGeom prst="rect">
+              <a:avLst/>
+            </a:prstGeom>
+            <a:noFill/>
+          </p:spPr>
+          <p:txBody>
+            <a:bodyPr wrap="none" rtlCol="0">
+              <a:spAutoFit/>
+            </a:bodyPr>
+            <a:lstStyle/>
+            <a:p>
+              <a:r>
+                <a:rPr lang="en-US" sz="2800" dirty="0">
+                  <a:solidFill>
+                    <a:srgbClr val="009EC0"/>
+                  </a:solidFill>
+                </a:rPr>
+                <a:t>What?</a:t>
+              </a:r>
+            </a:p>
+          </p:txBody>
+        </p:sp>
+        <p:sp>
+          <p:nvSpPr>
+            <p:cNvPr id="3" name="TextBox 2">
+              <a:extLst>
+                <a:ext uri="{FF2B5EF4-FFF2-40B4-BE49-F238E27FC236}">
+                  <a16:creationId xmlns:a16="http://schemas.microsoft.com/office/drawing/2014/main" id="{E796A5EC-87C6-D048-8010-771FD1CA8E24}"/>
+                </a:ext>
+              </a:extLst>
+            </p:cNvPr>
+            <p:cNvSpPr txBox="1"/>
+            <p:nvPr/>
+          </p:nvSpPr>
+          <p:spPr>
+            <a:xfrm>
+              <a:off x="1600201" y="4648200"/>
+              <a:ext cx="7429500" cy="954107"/>
+            </a:xfrm>
+            <a:prstGeom prst="rect">
+              <a:avLst/>
+            </a:prstGeom>
+            <a:noFill/>
+          </p:spPr>
+          <p:txBody>
+            <a:bodyPr wrap="square" rtlCol="0">
+              <a:spAutoFit/>
+            </a:bodyPr>
+            <a:lstStyle/>
+            <a:p>
+              <a:r>
+                <a:rPr lang="en-US" sz="2800" dirty="0">
+                  <a:solidFill>
+                    <a:schemeClr val="tx1"/>
+                  </a:solidFill>
+                </a:rPr>
+                <a:t>Time on </a:t>
+              </a:r>
+              <a:r>
+                <a:rPr lang="en-US" sz="2800" b="1" dirty="0">
+                  <a:solidFill>
+                    <a:schemeClr val="tx1"/>
+                  </a:solidFill>
+                  <a:highlight>
+                    <a:srgbClr val="C00002"/>
+                  </a:highlight>
+                </a:rPr>
+                <a:t>“pre-evangelism</a:t>
+              </a:r>
+              <a:r>
+                <a:rPr lang="en-US" sz="2800" dirty="0">
+                  <a:solidFill>
+                    <a:schemeClr val="tx1"/>
+                  </a:solidFill>
+                  <a:highlight>
+                    <a:srgbClr val="C00002"/>
+                  </a:highlight>
+                </a:rPr>
+                <a:t>”</a:t>
+              </a:r>
+              <a:r>
+                <a:rPr lang="en-US" sz="2800" dirty="0">
+                  <a:solidFill>
+                    <a:schemeClr val="tx1"/>
+                  </a:solidFill>
+                </a:rPr>
+                <a:t> is time well spent; a call-to-action every time is not required</a:t>
+              </a:r>
+            </a:p>
+          </p:txBody>
+        </p:sp>
+      </p:grpSp>
+      <p:grpSp>
+        <p:nvGrpSpPr>
+          <p:cNvPr id="6" name="Group 5">
+            <a:extLst>
+              <a:ext uri="{FF2B5EF4-FFF2-40B4-BE49-F238E27FC236}">
+                <a16:creationId xmlns:a16="http://schemas.microsoft.com/office/drawing/2014/main" id="{16DEED69-411E-5C47-8C2F-1FA7F3AC4BAB}"/>
+              </a:ext>
+            </a:extLst>
+          </p:cNvPr>
+          <p:cNvGrpSpPr/>
+          <p:nvPr/>
+        </p:nvGrpSpPr>
+        <p:grpSpPr>
+          <a:xfrm>
+            <a:off x="209549" y="2860491"/>
+            <a:ext cx="8724901" cy="954107"/>
+            <a:chOff x="304800" y="4648200"/>
+            <a:chExt cx="8724901" cy="954107"/>
+          </a:xfrm>
+        </p:grpSpPr>
+        <p:sp>
+          <p:nvSpPr>
+            <p:cNvPr id="7" name="TextBox 6">
+              <a:extLst>
+                <a:ext uri="{FF2B5EF4-FFF2-40B4-BE49-F238E27FC236}">
+                  <a16:creationId xmlns:a16="http://schemas.microsoft.com/office/drawing/2014/main" id="{0BE67C1E-EE53-F64B-A1C4-C71C7BD5283F}"/>
+                </a:ext>
+              </a:extLst>
+            </p:cNvPr>
+            <p:cNvSpPr txBox="1"/>
+            <p:nvPr/>
+          </p:nvSpPr>
+          <p:spPr>
+            <a:xfrm>
+              <a:off x="304800" y="4648200"/>
+              <a:ext cx="1014765" cy="523220"/>
+            </a:xfrm>
+            <a:prstGeom prst="rect">
+              <a:avLst/>
+            </a:prstGeom>
+            <a:noFill/>
+          </p:spPr>
+          <p:txBody>
+            <a:bodyPr wrap="none" rtlCol="0">
+              <a:spAutoFit/>
+            </a:bodyPr>
+            <a:lstStyle/>
+            <a:p>
+              <a:r>
+                <a:rPr lang="en-US" sz="2800" dirty="0">
+                  <a:solidFill>
+                    <a:srgbClr val="009EC0"/>
+                  </a:solidFill>
+                </a:rPr>
+                <a:t>Why?</a:t>
+              </a:r>
+            </a:p>
+          </p:txBody>
+        </p:sp>
+        <p:sp>
+          <p:nvSpPr>
+            <p:cNvPr id="8" name="TextBox 7">
+              <a:extLst>
+                <a:ext uri="{FF2B5EF4-FFF2-40B4-BE49-F238E27FC236}">
+                  <a16:creationId xmlns:a16="http://schemas.microsoft.com/office/drawing/2014/main" id="{44657A2D-A10C-1745-AFDB-1C0FC5EA2AAD}"/>
+                </a:ext>
+              </a:extLst>
+            </p:cNvPr>
+            <p:cNvSpPr txBox="1"/>
+            <p:nvPr/>
+          </p:nvSpPr>
+          <p:spPr>
+            <a:xfrm>
+              <a:off x="1600201" y="4648200"/>
+              <a:ext cx="7429500" cy="954107"/>
+            </a:xfrm>
+            <a:prstGeom prst="rect">
+              <a:avLst/>
+            </a:prstGeom>
+            <a:noFill/>
+          </p:spPr>
+          <p:txBody>
+            <a:bodyPr wrap="square" rtlCol="0">
+              <a:spAutoFit/>
+            </a:bodyPr>
+            <a:lstStyle/>
+            <a:p>
+              <a:r>
+                <a:rPr lang="en-US" sz="2800" dirty="0"/>
+                <a:t>So that we </a:t>
+              </a:r>
+              <a:r>
+                <a:rPr lang="en-US" sz="2800" b="1" dirty="0">
+                  <a:highlight>
+                    <a:srgbClr val="C00002"/>
+                  </a:highlight>
+                </a:rPr>
+                <a:t>don’t overload</a:t>
+              </a:r>
+              <a:r>
+                <a:rPr lang="en-US" sz="2800" dirty="0"/>
+                <a:t> our audience or ourselves</a:t>
+              </a:r>
+            </a:p>
+          </p:txBody>
+        </p:sp>
+      </p:grpSp>
+      <p:grpSp>
+        <p:nvGrpSpPr>
+          <p:cNvPr id="9" name="Group 8">
+            <a:extLst>
+              <a:ext uri="{FF2B5EF4-FFF2-40B4-BE49-F238E27FC236}">
+                <a16:creationId xmlns:a16="http://schemas.microsoft.com/office/drawing/2014/main" id="{493A2E7B-FE2C-7045-B882-6D1EC3306C1D}"/>
+              </a:ext>
+            </a:extLst>
+          </p:cNvPr>
+          <p:cNvGrpSpPr/>
+          <p:nvPr/>
+        </p:nvGrpSpPr>
+        <p:grpSpPr>
+          <a:xfrm>
+            <a:off x="209549" y="4051518"/>
+            <a:ext cx="8724901" cy="954107"/>
+            <a:chOff x="304800" y="4648200"/>
+            <a:chExt cx="8724901" cy="954107"/>
+          </a:xfrm>
+        </p:grpSpPr>
+        <p:sp>
+          <p:nvSpPr>
+            <p:cNvPr id="10" name="TextBox 9">
+              <a:extLst>
+                <a:ext uri="{FF2B5EF4-FFF2-40B4-BE49-F238E27FC236}">
+                  <a16:creationId xmlns:a16="http://schemas.microsoft.com/office/drawing/2014/main" id="{DCC9CB31-E9E8-7549-8460-8E8840BD1585}"/>
+                </a:ext>
+              </a:extLst>
+            </p:cNvPr>
+            <p:cNvSpPr txBox="1"/>
+            <p:nvPr/>
+          </p:nvSpPr>
+          <p:spPr>
+            <a:xfrm>
+              <a:off x="304800" y="4648200"/>
+              <a:ext cx="1020023" cy="523220"/>
+            </a:xfrm>
+            <a:prstGeom prst="rect">
+              <a:avLst/>
+            </a:prstGeom>
+            <a:noFill/>
+          </p:spPr>
+          <p:txBody>
+            <a:bodyPr wrap="none" rtlCol="0">
+              <a:spAutoFit/>
+            </a:bodyPr>
+            <a:lstStyle/>
+            <a:p>
+              <a:r>
+                <a:rPr lang="en-US" sz="2800" dirty="0">
+                  <a:solidFill>
+                    <a:srgbClr val="009EC0"/>
+                  </a:solidFill>
+                </a:rPr>
+                <a:t>How?</a:t>
+              </a:r>
+            </a:p>
+          </p:txBody>
+        </p:sp>
+        <p:sp>
+          <p:nvSpPr>
+            <p:cNvPr id="11" name="TextBox 10">
+              <a:extLst>
+                <a:ext uri="{FF2B5EF4-FFF2-40B4-BE49-F238E27FC236}">
+                  <a16:creationId xmlns:a16="http://schemas.microsoft.com/office/drawing/2014/main" id="{4729ADED-FFF5-454C-BE17-6323C474D829}"/>
+                </a:ext>
+              </a:extLst>
+            </p:cNvPr>
+            <p:cNvSpPr txBox="1"/>
+            <p:nvPr/>
+          </p:nvSpPr>
+          <p:spPr>
+            <a:xfrm>
+              <a:off x="1600201" y="4648200"/>
+              <a:ext cx="7429500" cy="954107"/>
+            </a:xfrm>
+            <a:prstGeom prst="rect">
+              <a:avLst/>
+            </a:prstGeom>
+            <a:noFill/>
+          </p:spPr>
+          <p:txBody>
+            <a:bodyPr wrap="square" rtlCol="0">
+              <a:spAutoFit/>
+            </a:bodyPr>
+            <a:lstStyle/>
+            <a:p>
+              <a:r>
+                <a:rPr lang="en-US" sz="2800" dirty="0"/>
+                <a:t>By showing that the conversion process has </a:t>
+              </a:r>
+              <a:r>
+                <a:rPr lang="en-US" sz="2800" b="1" dirty="0">
+                  <a:highlight>
+                    <a:srgbClr val="C00002"/>
+                  </a:highlight>
+                </a:rPr>
+                <a:t>more than one step</a:t>
+              </a:r>
+              <a:endParaRPr lang="en-US" sz="2800" dirty="0"/>
+            </a:p>
+          </p:txBody>
+        </p:sp>
+      </p:grpSp>
+      <p:cxnSp>
+        <p:nvCxnSpPr>
+          <p:cNvPr id="13" name="Straight Connector 12">
+            <a:extLst>
+              <a:ext uri="{FF2B5EF4-FFF2-40B4-BE49-F238E27FC236}">
+                <a16:creationId xmlns:a16="http://schemas.microsoft.com/office/drawing/2014/main" id="{09B462F9-C753-8044-8DE2-965ABC154D9C}"/>
+              </a:ext>
+            </a:extLst>
+          </p:cNvPr>
+          <p:cNvCxnSpPr>
+            <a:cxnSpLocks/>
+          </p:cNvCxnSpPr>
+          <p:nvPr/>
+        </p:nvCxnSpPr>
+        <p:spPr>
+          <a:xfrm>
+            <a:off x="1373874" y="1669464"/>
+            <a:ext cx="0" cy="4197936"/>
+          </a:xfrm>
+          <a:prstGeom prst="line">
+            <a:avLst/>
+          </a:prstGeom>
+          <a:ln>
+            <a:solidFill>
+              <a:schemeClr val="bg1">
+                <a:lumMod val="75000"/>
+                <a:lumOff val="25000"/>
+              </a:schemeClr>
+            </a:solidFill>
+          </a:ln>
+        </p:spPr>
+        <p:style>
+          <a:lnRef idx="1">
+            <a:schemeClr val="accent1"/>
+          </a:lnRef>
+          <a:fillRef idx="0">
+            <a:schemeClr val="accent1"/>
+          </a:fillRef>
+          <a:effectRef idx="0">
+            <a:schemeClr val="accent1"/>
+          </a:effectRef>
+          <a:fontRef idx="minor">
+            <a:schemeClr val="tx1"/>
+          </a:fontRef>
+        </p:style>
+      </p:cxnSp>
+      <p:sp>
+        <p:nvSpPr>
+          <p:cNvPr id="15" name="TextBox 14">
+            <a:extLst>
+              <a:ext uri="{FF2B5EF4-FFF2-40B4-BE49-F238E27FC236}">
+                <a16:creationId xmlns:a16="http://schemas.microsoft.com/office/drawing/2014/main" id="{C43D1156-26DE-A44F-B5F8-AACFA794E957}"/>
+              </a:ext>
+            </a:extLst>
+          </p:cNvPr>
+          <p:cNvSpPr txBox="1"/>
+          <p:nvPr/>
+        </p:nvSpPr>
+        <p:spPr>
+          <a:xfrm>
+            <a:off x="209549" y="708674"/>
+            <a:ext cx="8934451" cy="769441"/>
+          </a:xfrm>
+          <a:prstGeom prst="rect">
+            <a:avLst/>
+          </a:prstGeom>
+          <a:noFill/>
+        </p:spPr>
+        <p:txBody>
+          <a:bodyPr wrap="square" rtlCol="0">
+            <a:spAutoFit/>
           </a:bodyPr>
           <a:lstStyle/>
           <a:p>
             <a:r>
-              <a:rPr lang="en-US" dirty="0"/>
-              <a:t>What are some topics that it doesn’t make sense to focus on?</a:t>
-            </a:r>
-          </a:p>
-        </p:txBody>
-      </p:sp>
-      <p:sp>
-        <p:nvSpPr>
-          <p:cNvPr id="3" name="Text Placeholder 2"/>
-          <p:cNvSpPr>
-            <a:spLocks noGrp="1"/>
-          </p:cNvSpPr>
-          <p:nvPr>
-            <p:ph type="body" sz="quarter" idx="13"/>
-          </p:nvPr>
-        </p:nvSpPr>
-        <p:spPr/>
-        <p:txBody>
-          <a:bodyPr/>
-          <a:lstStyle/>
-          <a:p>
-            <a:r>
-              <a:rPr lang="en-US" dirty="0"/>
-              <a:t>1</a:t>
+              <a:rPr lang="en-US" sz="4400" b="1" dirty="0"/>
+              <a:t>IDEA IN BRIEF</a:t>
             </a:r>
           </a:p>
         </p:txBody>
@@ -4757,13 +5357,302 @@
     </p:spTree>
     <p:extLst>
       <p:ext uri="{BB962C8B-B14F-4D97-AF65-F5344CB8AC3E}">
-        <p14:creationId xmlns:p14="http://schemas.microsoft.com/office/powerpoint/2010/main" val="2094317165"/>
+        <p14:creationId xmlns:p14="http://schemas.microsoft.com/office/powerpoint/2010/main" val="1389460841"/>
       </p:ext>
     </p:extLst>
   </p:cSld>
   <p:clrMapOvr>
     <a:masterClrMapping/>
   </p:clrMapOvr>
+  <p:timing>
+    <p:tnLst>
+      <p:par>
+        <p:cTn id="1" dur="indefinite" restart="never" nodeType="tmRoot">
+          <p:childTnLst>
+            <p:seq concurrent="1" nextAc="seek">
+              <p:cTn id="2" dur="indefinite" nodeType="mainSeq">
+                <p:childTnLst>
+                  <p:par>
+                    <p:cTn id="3" fill="hold">
+                      <p:stCondLst>
+                        <p:cond delay="indefinite"/>
+                      </p:stCondLst>
+                      <p:childTnLst>
+                        <p:par>
+                          <p:cTn id="4" fill="hold">
+                            <p:stCondLst>
+                              <p:cond delay="0"/>
+                            </p:stCondLst>
+                            <p:childTnLst>
+                              <p:par>
+                                <p:cTn id="5" presetID="10" presetClass="entr" presetSubtype="0" fill="hold" grpId="0" nodeType="clickEffect">
+                                  <p:stCondLst>
+                                    <p:cond delay="0"/>
+                                  </p:stCondLst>
+                                  <p:childTnLst>
+                                    <p:set>
+                                      <p:cBhvr>
+                                        <p:cTn id="6" dur="1" fill="hold">
+                                          <p:stCondLst>
+                                            <p:cond delay="0"/>
+                                          </p:stCondLst>
+                                        </p:cTn>
+                                        <p:tgtEl>
+                                          <p:spTgt spid="15"/>
+                                        </p:tgtEl>
+                                        <p:attrNameLst>
+                                          <p:attrName>style.visibility</p:attrName>
+                                        </p:attrNameLst>
+                                      </p:cBhvr>
+                                      <p:to>
+                                        <p:strVal val="visible"/>
+                                      </p:to>
+                                    </p:set>
+                                    <p:animEffect transition="in" filter="fade">
+                                      <p:cBhvr>
+                                        <p:cTn id="7" dur="250"/>
+                                        <p:tgtEl>
+                                          <p:spTgt spid="15"/>
+                                        </p:tgtEl>
+                                      </p:cBhvr>
+                                    </p:animEffect>
+                                  </p:childTnLst>
+                                </p:cTn>
+                              </p:par>
+                            </p:childTnLst>
+                          </p:cTn>
+                        </p:par>
+                      </p:childTnLst>
+                    </p:cTn>
+                  </p:par>
+                  <p:par>
+                    <p:cTn id="8" fill="hold">
+                      <p:stCondLst>
+                        <p:cond delay="indefinite"/>
+                      </p:stCondLst>
+                      <p:childTnLst>
+                        <p:par>
+                          <p:cTn id="9" fill="hold">
+                            <p:stCondLst>
+                              <p:cond delay="0"/>
+                            </p:stCondLst>
+                            <p:childTnLst>
+                              <p:par>
+                                <p:cTn id="10" presetID="10" presetClass="entr" presetSubtype="0" fill="hold" nodeType="clickEffect">
+                                  <p:stCondLst>
+                                    <p:cond delay="0"/>
+                                  </p:stCondLst>
+                                  <p:childTnLst>
+                                    <p:set>
+                                      <p:cBhvr>
+                                        <p:cTn id="11" dur="1" fill="hold">
+                                          <p:stCondLst>
+                                            <p:cond delay="0"/>
+                                          </p:stCondLst>
+                                        </p:cTn>
+                                        <p:tgtEl>
+                                          <p:spTgt spid="13"/>
+                                        </p:tgtEl>
+                                        <p:attrNameLst>
+                                          <p:attrName>style.visibility</p:attrName>
+                                        </p:attrNameLst>
+                                      </p:cBhvr>
+                                      <p:to>
+                                        <p:strVal val="visible"/>
+                                      </p:to>
+                                    </p:set>
+                                    <p:animEffect transition="in" filter="fade">
+                                      <p:cBhvr>
+                                        <p:cTn id="12" dur="250"/>
+                                        <p:tgtEl>
+                                          <p:spTgt spid="13"/>
+                                        </p:tgtEl>
+                                      </p:cBhvr>
+                                    </p:animEffect>
+                                  </p:childTnLst>
+                                </p:cTn>
+                              </p:par>
+                            </p:childTnLst>
+                          </p:cTn>
+                        </p:par>
+                        <p:par>
+                          <p:cTn id="13" fill="hold">
+                            <p:stCondLst>
+                              <p:cond delay="250"/>
+                            </p:stCondLst>
+                            <p:childTnLst>
+                              <p:par>
+                                <p:cTn id="14" presetID="10" presetClass="entr" presetSubtype="0" fill="hold" nodeType="afterEffect">
+                                  <p:stCondLst>
+                                    <p:cond delay="0"/>
+                                  </p:stCondLst>
+                                  <p:childTnLst>
+                                    <p:set>
+                                      <p:cBhvr>
+                                        <p:cTn id="15" dur="1" fill="hold">
+                                          <p:stCondLst>
+                                            <p:cond delay="0"/>
+                                          </p:stCondLst>
+                                        </p:cTn>
+                                        <p:tgtEl>
+                                          <p:spTgt spid="4"/>
+                                        </p:tgtEl>
+                                        <p:attrNameLst>
+                                          <p:attrName>style.visibility</p:attrName>
+                                        </p:attrNameLst>
+                                      </p:cBhvr>
+                                      <p:to>
+                                        <p:strVal val="visible"/>
+                                      </p:to>
+                                    </p:set>
+                                    <p:animEffect transition="in" filter="fade">
+                                      <p:cBhvr>
+                                        <p:cTn id="16" dur="250"/>
+                                        <p:tgtEl>
+                                          <p:spTgt spid="4"/>
+                                        </p:tgtEl>
+                                      </p:cBhvr>
+                                    </p:animEffect>
+                                  </p:childTnLst>
+                                </p:cTn>
+                              </p:par>
+                            </p:childTnLst>
+                          </p:cTn>
+                        </p:par>
+                      </p:childTnLst>
+                    </p:cTn>
+                  </p:par>
+                  <p:par>
+                    <p:cTn id="17" fill="hold">
+                      <p:stCondLst>
+                        <p:cond delay="indefinite"/>
+                      </p:stCondLst>
+                      <p:childTnLst>
+                        <p:par>
+                          <p:cTn id="18" fill="hold">
+                            <p:stCondLst>
+                              <p:cond delay="0"/>
+                            </p:stCondLst>
+                            <p:childTnLst>
+                              <p:par>
+                                <p:cTn id="19" presetID="10" presetClass="entr" presetSubtype="0" fill="hold" nodeType="clickEffect">
+                                  <p:stCondLst>
+                                    <p:cond delay="0"/>
+                                  </p:stCondLst>
+                                  <p:childTnLst>
+                                    <p:set>
+                                      <p:cBhvr>
+                                        <p:cTn id="20" dur="1" fill="hold">
+                                          <p:stCondLst>
+                                            <p:cond delay="0"/>
+                                          </p:stCondLst>
+                                        </p:cTn>
+                                        <p:tgtEl>
+                                          <p:spTgt spid="6"/>
+                                        </p:tgtEl>
+                                        <p:attrNameLst>
+                                          <p:attrName>style.visibility</p:attrName>
+                                        </p:attrNameLst>
+                                      </p:cBhvr>
+                                      <p:to>
+                                        <p:strVal val="visible"/>
+                                      </p:to>
+                                    </p:set>
+                                    <p:animEffect transition="in" filter="fade">
+                                      <p:cBhvr>
+                                        <p:cTn id="21" dur="250"/>
+                                        <p:tgtEl>
+                                          <p:spTgt spid="6"/>
+                                        </p:tgtEl>
+                                      </p:cBhvr>
+                                    </p:animEffect>
+                                  </p:childTnLst>
+                                </p:cTn>
+                              </p:par>
+                            </p:childTnLst>
+                          </p:cTn>
+                        </p:par>
+                      </p:childTnLst>
+                    </p:cTn>
+                  </p:par>
+                  <p:par>
+                    <p:cTn id="22" fill="hold">
+                      <p:stCondLst>
+                        <p:cond delay="indefinite"/>
+                      </p:stCondLst>
+                      <p:childTnLst>
+                        <p:par>
+                          <p:cTn id="23" fill="hold">
+                            <p:stCondLst>
+                              <p:cond delay="0"/>
+                            </p:stCondLst>
+                            <p:childTnLst>
+                              <p:par>
+                                <p:cTn id="24" presetID="10" presetClass="entr" presetSubtype="0" fill="hold" nodeType="clickEffect">
+                                  <p:stCondLst>
+                                    <p:cond delay="0"/>
+                                  </p:stCondLst>
+                                  <p:childTnLst>
+                                    <p:set>
+                                      <p:cBhvr>
+                                        <p:cTn id="25" dur="1" fill="hold">
+                                          <p:stCondLst>
+                                            <p:cond delay="0"/>
+                                          </p:stCondLst>
+                                        </p:cTn>
+                                        <p:tgtEl>
+                                          <p:spTgt spid="9"/>
+                                        </p:tgtEl>
+                                        <p:attrNameLst>
+                                          <p:attrName>style.visibility</p:attrName>
+                                        </p:attrNameLst>
+                                      </p:cBhvr>
+                                      <p:to>
+                                        <p:strVal val="visible"/>
+                                      </p:to>
+                                    </p:set>
+                                    <p:animEffect transition="in" filter="fade">
+                                      <p:cBhvr>
+                                        <p:cTn id="26" dur="250"/>
+                                        <p:tgtEl>
+                                          <p:spTgt spid="9"/>
+                                        </p:tgtEl>
+                                      </p:cBhvr>
+                                    </p:animEffect>
+                                  </p:childTnLst>
+                                </p:cTn>
+                              </p:par>
+                            </p:childTnLst>
+                          </p:cTn>
+                        </p:par>
+                      </p:childTnLst>
+                    </p:cTn>
+                  </p:par>
+                </p:childTnLst>
+              </p:cTn>
+              <p:prevCondLst>
+                <p:cond evt="onPrev" delay="0">
+                  <p:tgtEl>
+                    <p:sldTgt/>
+                  </p:tgtEl>
+                </p:cond>
+              </p:prevCondLst>
+              <p:nextCondLst>
+                <p:cond evt="onNext" delay="0">
+                  <p:tgtEl>
+                    <p:sldTgt/>
+                  </p:tgtEl>
+                </p:cond>
+              </p:nextCondLst>
+            </p:seq>
+          </p:childTnLst>
+        </p:cTn>
+      </p:par>
+    </p:tnLst>
+    <p:bldLst>
+      <p:bldP spid="15" grpId="0"/>
+    </p:bldLst>
+  </p:timing>
 </p:sld>
 </file>
 
@@ -4803,7 +5692,7 @@
           <a:p>
             <a:r>
               <a:rPr lang="en-US" dirty="0"/>
-              <a:t>What are some topics that it likely does make sense to focus on?</a:t>
+              <a:t>What are some topics that it doesn’t make sense to focus on?</a:t>
             </a:r>
           </a:p>
         </p:txBody>
@@ -4825,7 +5714,7 @@
           <a:p>
             <a:r>
               <a:rPr lang="en-US" dirty="0"/>
-              <a:t>2</a:t>
+              <a:t>1</a:t>
             </a:r>
           </a:p>
         </p:txBody>
@@ -4833,7 +5722,7 @@
     </p:spTree>
     <p:extLst>
       <p:ext uri="{BB962C8B-B14F-4D97-AF65-F5344CB8AC3E}">
-        <p14:creationId xmlns:p14="http://schemas.microsoft.com/office/powerpoint/2010/main" val="1096188900"/>
+        <p14:creationId xmlns:p14="http://schemas.microsoft.com/office/powerpoint/2010/main" val="2094317165"/>
       </p:ext>
     </p:extLst>
   </p:cSld>
@@ -4879,6 +5768,82 @@
           <a:p>
             <a:r>
               <a:rPr lang="en-US" dirty="0"/>
+              <a:t>What are some topics that it likely does make sense to focus on?</a:t>
+            </a:r>
+          </a:p>
+        </p:txBody>
+      </p:sp>
+      <p:sp>
+        <p:nvSpPr>
+          <p:cNvPr id="3" name="Text Placeholder 2"/>
+          <p:cNvSpPr>
+            <a:spLocks noGrp="1"/>
+          </p:cNvSpPr>
+          <p:nvPr>
+            <p:ph type="body" sz="quarter" idx="13"/>
+          </p:nvPr>
+        </p:nvSpPr>
+        <p:spPr/>
+        <p:txBody>
+          <a:bodyPr/>
+          <a:lstStyle/>
+          <a:p>
+            <a:r>
+              <a:rPr lang="en-US" dirty="0"/>
+              <a:t>2</a:t>
+            </a:r>
+          </a:p>
+        </p:txBody>
+      </p:sp>
+    </p:spTree>
+    <p:extLst>
+      <p:ext uri="{BB962C8B-B14F-4D97-AF65-F5344CB8AC3E}">
+        <p14:creationId xmlns:p14="http://schemas.microsoft.com/office/powerpoint/2010/main" val="1096188900"/>
+      </p:ext>
+    </p:extLst>
+  </p:cSld>
+  <p:clrMapOvr>
+    <a:masterClrMapping/>
+  </p:clrMapOvr>
+</p:sld>
+</file>
+
+<file path=ppt/slides/slide5.xml><?xml version="1.0" encoding="utf-8"?>
+<p:sld xmlns:a="http://schemas.openxmlformats.org/drawingml/2006/main" xmlns:r="http://schemas.openxmlformats.org/officeDocument/2006/relationships" xmlns:p="http://schemas.openxmlformats.org/presentationml/2006/main">
+  <p:cSld>
+    <p:spTree>
+      <p:nvGrpSpPr>
+        <p:cNvPr id="1" name=""/>
+        <p:cNvGrpSpPr/>
+        <p:nvPr/>
+      </p:nvGrpSpPr>
+      <p:grpSpPr>
+        <a:xfrm>
+          <a:off x="0" y="0"/>
+          <a:ext cx="0" cy="0"/>
+          <a:chOff x="0" y="0"/>
+          <a:chExt cx="0" cy="0"/>
+        </a:xfrm>
+      </p:grpSpPr>
+      <p:sp>
+        <p:nvSpPr>
+          <p:cNvPr id="2" name="Title 1"/>
+          <p:cNvSpPr>
+            <a:spLocks noGrp="1"/>
+          </p:cNvSpPr>
+          <p:nvPr>
+            <p:ph type="title"/>
+          </p:nvPr>
+        </p:nvSpPr>
+        <p:spPr/>
+        <p:txBody>
+          <a:bodyPr>
+            <a:normAutofit fontScale="90000"/>
+          </a:bodyPr>
+          <a:lstStyle/>
+          <a:p>
+            <a:r>
+              <a:rPr lang="en-US" dirty="0"/>
               <a:t>What does it mean that Paul planted, and Apollos watered?</a:t>
             </a:r>
           </a:p>
@@ -4919,7 +5884,7 @@
 </p:sld>
 </file>
 
-<file path=ppt/slides/slide5.xml><?xml version="1.0" encoding="utf-8"?>
+<file path=ppt/slides/slide6.xml><?xml version="1.0" encoding="utf-8"?>
 <p:sld xmlns:a="http://schemas.openxmlformats.org/drawingml/2006/main" xmlns:r="http://schemas.openxmlformats.org/officeDocument/2006/relationships" xmlns:p="http://schemas.openxmlformats.org/presentationml/2006/main">
   <p:cSld>
     <p:spTree>
@@ -5607,82 +6572,6 @@
 </p:sld>
 </file>
 
-<file path=ppt/slides/slide6.xml><?xml version="1.0" encoding="utf-8"?>
-<p:sld xmlns:a="http://schemas.openxmlformats.org/drawingml/2006/main" xmlns:r="http://schemas.openxmlformats.org/officeDocument/2006/relationships" xmlns:p="http://schemas.openxmlformats.org/presentationml/2006/main">
-  <p:cSld>
-    <p:spTree>
-      <p:nvGrpSpPr>
-        <p:cNvPr id="1" name=""/>
-        <p:cNvGrpSpPr/>
-        <p:nvPr/>
-      </p:nvGrpSpPr>
-      <p:grpSpPr>
-        <a:xfrm>
-          <a:off x="0" y="0"/>
-          <a:ext cx="0" cy="0"/>
-          <a:chOff x="0" y="0"/>
-          <a:chExt cx="0" cy="0"/>
-        </a:xfrm>
-      </p:grpSpPr>
-      <p:sp>
-        <p:nvSpPr>
-          <p:cNvPr id="2" name="Title 1"/>
-          <p:cNvSpPr>
-            <a:spLocks noGrp="1"/>
-          </p:cNvSpPr>
-          <p:nvPr>
-            <p:ph type="title"/>
-          </p:nvPr>
-        </p:nvSpPr>
-        <p:spPr/>
-        <p:txBody>
-          <a:bodyPr>
-            <a:normAutofit fontScale="90000"/>
-          </a:bodyPr>
-          <a:lstStyle/>
-          <a:p>
-            <a:r>
-              <a:rPr lang="en-US" dirty="0"/>
-              <a:t>Describe the distinction between the sower and the reaper in John 4:35-39</a:t>
-            </a:r>
-          </a:p>
-        </p:txBody>
-      </p:sp>
-      <p:sp>
-        <p:nvSpPr>
-          <p:cNvPr id="3" name="Text Placeholder 2"/>
-          <p:cNvSpPr>
-            <a:spLocks noGrp="1"/>
-          </p:cNvSpPr>
-          <p:nvPr>
-            <p:ph type="body" sz="quarter" idx="13"/>
-          </p:nvPr>
-        </p:nvSpPr>
-        <p:spPr/>
-        <p:txBody>
-          <a:bodyPr/>
-          <a:lstStyle/>
-          <a:p>
-            <a:r>
-              <a:rPr lang="en-US" dirty="0"/>
-              <a:t>4</a:t>
-            </a:r>
-          </a:p>
-        </p:txBody>
-      </p:sp>
-    </p:spTree>
-    <p:extLst>
-      <p:ext uri="{BB962C8B-B14F-4D97-AF65-F5344CB8AC3E}">
-        <p14:creationId xmlns:p14="http://schemas.microsoft.com/office/powerpoint/2010/main" val="1588901717"/>
-      </p:ext>
-    </p:extLst>
-  </p:cSld>
-  <p:clrMapOvr>
-    <a:masterClrMapping/>
-  </p:clrMapOvr>
-</p:sld>
-</file>
-
 <file path=ppt/slides/slide7.xml><?xml version="1.0" encoding="utf-8"?>
 <p:sld xmlns:a="http://schemas.openxmlformats.org/drawingml/2006/main" xmlns:r="http://schemas.openxmlformats.org/officeDocument/2006/relationships" xmlns:p="http://schemas.openxmlformats.org/presentationml/2006/main">
   <p:cSld>
@@ -5719,6 +6608,82 @@
           <a:p>
             <a:r>
               <a:rPr lang="en-US" dirty="0"/>
+              <a:t>Describe the distinction between the sower and the reaper in John 4:35-39</a:t>
+            </a:r>
+          </a:p>
+        </p:txBody>
+      </p:sp>
+      <p:sp>
+        <p:nvSpPr>
+          <p:cNvPr id="3" name="Text Placeholder 2"/>
+          <p:cNvSpPr>
+            <a:spLocks noGrp="1"/>
+          </p:cNvSpPr>
+          <p:nvPr>
+            <p:ph type="body" sz="quarter" idx="13"/>
+          </p:nvPr>
+        </p:nvSpPr>
+        <p:spPr/>
+        <p:txBody>
+          <a:bodyPr/>
+          <a:lstStyle/>
+          <a:p>
+            <a:r>
+              <a:rPr lang="en-US" dirty="0"/>
+              <a:t>4</a:t>
+            </a:r>
+          </a:p>
+        </p:txBody>
+      </p:sp>
+    </p:spTree>
+    <p:extLst>
+      <p:ext uri="{BB962C8B-B14F-4D97-AF65-F5344CB8AC3E}">
+        <p14:creationId xmlns:p14="http://schemas.microsoft.com/office/powerpoint/2010/main" val="1588901717"/>
+      </p:ext>
+    </p:extLst>
+  </p:cSld>
+  <p:clrMapOvr>
+    <a:masterClrMapping/>
+  </p:clrMapOvr>
+</p:sld>
+</file>
+
+<file path=ppt/slides/slide8.xml><?xml version="1.0" encoding="utf-8"?>
+<p:sld xmlns:a="http://schemas.openxmlformats.org/drawingml/2006/main" xmlns:r="http://schemas.openxmlformats.org/officeDocument/2006/relationships" xmlns:p="http://schemas.openxmlformats.org/presentationml/2006/main">
+  <p:cSld>
+    <p:spTree>
+      <p:nvGrpSpPr>
+        <p:cNvPr id="1" name=""/>
+        <p:cNvGrpSpPr/>
+        <p:nvPr/>
+      </p:nvGrpSpPr>
+      <p:grpSpPr>
+        <a:xfrm>
+          <a:off x="0" y="0"/>
+          <a:ext cx="0" cy="0"/>
+          <a:chOff x="0" y="0"/>
+          <a:chExt cx="0" cy="0"/>
+        </a:xfrm>
+      </p:grpSpPr>
+      <p:sp>
+        <p:nvSpPr>
+          <p:cNvPr id="2" name="Title 1"/>
+          <p:cNvSpPr>
+            <a:spLocks noGrp="1"/>
+          </p:cNvSpPr>
+          <p:nvPr>
+            <p:ph type="title"/>
+          </p:nvPr>
+        </p:nvSpPr>
+        <p:spPr/>
+        <p:txBody>
+          <a:bodyPr>
+            <a:normAutofit fontScale="90000"/>
+          </a:bodyPr>
+          <a:lstStyle/>
+          <a:p>
+            <a:r>
+              <a:rPr lang="en-US" dirty="0"/>
               <a:t>Describe the Gospel to someone who doesn’t know what it is</a:t>
             </a:r>
           </a:p>
@@ -5759,7 +6724,7 @@
 </p:sld>
 </file>
 
-<file path=ppt/slides/slide8.xml><?xml version="1.0" encoding="utf-8"?>
+<file path=ppt/slides/slide9.xml><?xml version="1.0" encoding="utf-8"?>
 <p:sld xmlns:a="http://schemas.openxmlformats.org/drawingml/2006/main" xmlns:r="http://schemas.openxmlformats.org/officeDocument/2006/relationships" xmlns:p="http://schemas.openxmlformats.org/presentationml/2006/main">
   <p:cSld>
     <p:spTree>

</xml_diff>